<commit_message>
rearranged slices and added wiki/mlist/gcal information
</commit_message>
<xml_diff>
--- a/Wk1/Bash is your friend.pptx
+++ b/Wk1/Bash is your friend.pptx
@@ -9,8 +9,8 @@
     <p:sldId id="257" r:id="rId3"/>
     <p:sldId id="258" r:id="rId4"/>
     <p:sldId id="259" r:id="rId5"/>
-    <p:sldId id="260" r:id="rId6"/>
-    <p:sldId id="262" r:id="rId7"/>
+    <p:sldId id="262" r:id="rId6"/>
+    <p:sldId id="260" r:id="rId7"/>
     <p:sldId id="261" r:id="rId8"/>
     <p:sldId id="263" r:id="rId9"/>
     <p:sldId id="264" r:id="rId10"/>
@@ -23,6 +23,7 @@
     <p:sldId id="271" r:id="rId17"/>
     <p:sldId id="272" r:id="rId18"/>
     <p:sldId id="273" r:id="rId19"/>
+    <p:sldId id="274" r:id="rId20"/>
   </p:sldIdLst>
   <p:sldSz cx="9144000" cy="6858000" type="screen4x3"/>
   <p:notesSz cx="6858000" cy="9144000"/>
@@ -306,7 +307,7 @@
             <a:fld id="{7B4F2DA5-F0EA-4EBD-9FDC-8E90B44A5797}" type="datetimeFigureOut">
               <a:rPr lang="en-US" smtClean="0"/>
               <a:pPr/>
-              <a:t>11/15/2010</a:t>
+              <a:t>11/17/2010</a:t>
             </a:fld>
             <a:endParaRPr lang="en-GB"/>
           </a:p>
@@ -473,7 +474,7 @@
             <a:fld id="{7B4F2DA5-F0EA-4EBD-9FDC-8E90B44A5797}" type="datetimeFigureOut">
               <a:rPr lang="en-US" smtClean="0"/>
               <a:pPr/>
-              <a:t>11/15/2010</a:t>
+              <a:t>11/17/2010</a:t>
             </a:fld>
             <a:endParaRPr lang="en-GB"/>
           </a:p>
@@ -650,7 +651,7 @@
             <a:fld id="{7B4F2DA5-F0EA-4EBD-9FDC-8E90B44A5797}" type="datetimeFigureOut">
               <a:rPr lang="en-US" smtClean="0"/>
               <a:pPr/>
-              <a:t>11/15/2010</a:t>
+              <a:t>11/17/2010</a:t>
             </a:fld>
             <a:endParaRPr lang="en-GB"/>
           </a:p>
@@ -817,7 +818,7 @@
             <a:fld id="{7B4F2DA5-F0EA-4EBD-9FDC-8E90B44A5797}" type="datetimeFigureOut">
               <a:rPr lang="en-US" smtClean="0"/>
               <a:pPr/>
-              <a:t>11/15/2010</a:t>
+              <a:t>11/17/2010</a:t>
             </a:fld>
             <a:endParaRPr lang="en-GB"/>
           </a:p>
@@ -1060,7 +1061,7 @@
             <a:fld id="{7B4F2DA5-F0EA-4EBD-9FDC-8E90B44A5797}" type="datetimeFigureOut">
               <a:rPr lang="en-US" smtClean="0"/>
               <a:pPr/>
-              <a:t>11/15/2010</a:t>
+              <a:t>11/17/2010</a:t>
             </a:fld>
             <a:endParaRPr lang="en-GB"/>
           </a:p>
@@ -1345,7 +1346,7 @@
             <a:fld id="{7B4F2DA5-F0EA-4EBD-9FDC-8E90B44A5797}" type="datetimeFigureOut">
               <a:rPr lang="en-US" smtClean="0"/>
               <a:pPr/>
-              <a:t>11/15/2010</a:t>
+              <a:t>11/17/2010</a:t>
             </a:fld>
             <a:endParaRPr lang="en-GB"/>
           </a:p>
@@ -1764,7 +1765,7 @@
             <a:fld id="{7B4F2DA5-F0EA-4EBD-9FDC-8E90B44A5797}" type="datetimeFigureOut">
               <a:rPr lang="en-US" smtClean="0"/>
               <a:pPr/>
-              <a:t>11/15/2010</a:t>
+              <a:t>11/17/2010</a:t>
             </a:fld>
             <a:endParaRPr lang="en-GB"/>
           </a:p>
@@ -1879,7 +1880,7 @@
             <a:fld id="{7B4F2DA5-F0EA-4EBD-9FDC-8E90B44A5797}" type="datetimeFigureOut">
               <a:rPr lang="en-US" smtClean="0"/>
               <a:pPr/>
-              <a:t>11/15/2010</a:t>
+              <a:t>11/17/2010</a:t>
             </a:fld>
             <a:endParaRPr lang="en-GB"/>
           </a:p>
@@ -1971,7 +1972,7 @@
             <a:fld id="{7B4F2DA5-F0EA-4EBD-9FDC-8E90B44A5797}" type="datetimeFigureOut">
               <a:rPr lang="en-US" smtClean="0"/>
               <a:pPr/>
-              <a:t>11/15/2010</a:t>
+              <a:t>11/17/2010</a:t>
             </a:fld>
             <a:endParaRPr lang="en-GB"/>
           </a:p>
@@ -2245,7 +2246,7 @@
             <a:fld id="{7B4F2DA5-F0EA-4EBD-9FDC-8E90B44A5797}" type="datetimeFigureOut">
               <a:rPr lang="en-US" smtClean="0"/>
               <a:pPr/>
-              <a:t>11/15/2010</a:t>
+              <a:t>11/17/2010</a:t>
             </a:fld>
             <a:endParaRPr lang="en-GB"/>
           </a:p>
@@ -2495,7 +2496,7 @@
             <a:fld id="{7B4F2DA5-F0EA-4EBD-9FDC-8E90B44A5797}" type="datetimeFigureOut">
               <a:rPr lang="en-US" smtClean="0"/>
               <a:pPr/>
-              <a:t>11/15/2010</a:t>
+              <a:t>11/17/2010</a:t>
             </a:fld>
             <a:endParaRPr lang="en-GB"/>
           </a:p>
@@ -2705,7 +2706,7 @@
             <a:fld id="{7B4F2DA5-F0EA-4EBD-9FDC-8E90B44A5797}" type="datetimeFigureOut">
               <a:rPr lang="en-US" smtClean="0"/>
               <a:pPr/>
-              <a:t>11/15/2010</a:t>
+              <a:t>11/17/2010</a:t>
             </a:fld>
             <a:endParaRPr lang="en-GB"/>
           </a:p>
@@ -3489,8 +3490,12 @@
                 <a:latin typeface="Courier New" pitchFamily="49" charset="0"/>
                 <a:cs typeface="Courier New" pitchFamily="49" charset="0"/>
               </a:rPr>
-              <a:t>-</a:t>
-            </a:r>
+              <a:t> -</a:t>
+            </a:r>
+            <a:endParaRPr lang="en-GB" dirty="0" smtClean="0">
+              <a:latin typeface="Courier New" pitchFamily="49" charset="0"/>
+              <a:cs typeface="Courier New" pitchFamily="49" charset="0"/>
+            </a:endParaRPr>
           </a:p>
         </p:txBody>
       </p:sp>
@@ -4445,6 +4450,128 @@
               <a:latin typeface="Courier New" pitchFamily="49" charset="0"/>
               <a:cs typeface="Courier New" pitchFamily="49" charset="0"/>
             </a:endParaRPr>
+          </a:p>
+        </p:txBody>
+      </p:sp>
+    </p:spTree>
+  </p:cSld>
+  <p:clrMapOvr>
+    <a:masterClrMapping/>
+  </p:clrMapOvr>
+</p:sld>
+</file>
+
+<file path=ppt/slides/slide19.xml><?xml version="1.0" encoding="utf-8"?>
+<p:sld xmlns:a="http://schemas.openxmlformats.org/drawingml/2006/main" xmlns:r="http://schemas.openxmlformats.org/officeDocument/2006/relationships" xmlns:p="http://schemas.openxmlformats.org/presentationml/2006/main">
+  <p:cSld>
+    <p:spTree>
+      <p:nvGrpSpPr>
+        <p:cNvPr id="1" name=""/>
+        <p:cNvGrpSpPr/>
+        <p:nvPr/>
+      </p:nvGrpSpPr>
+      <p:grpSpPr>
+        <a:xfrm>
+          <a:off x="0" y="0"/>
+          <a:ext cx="0" cy="0"/>
+          <a:chOff x="0" y="0"/>
+          <a:chExt cx="0" cy="0"/>
+        </a:xfrm>
+      </p:grpSpPr>
+      <p:sp>
+        <p:nvSpPr>
+          <p:cNvPr id="2" name="Title 1"/>
+          <p:cNvSpPr>
+            <a:spLocks noGrp="1"/>
+          </p:cNvSpPr>
+          <p:nvPr>
+            <p:ph type="title"/>
+          </p:nvPr>
+        </p:nvSpPr>
+        <p:spPr/>
+        <p:txBody>
+          <a:bodyPr/>
+          <a:lstStyle/>
+          <a:p>
+            <a:r>
+              <a:rPr lang="en-GB" dirty="0" err="1" smtClean="0"/>
+              <a:t>IntResComp</a:t>
+            </a:r>
+            <a:endParaRPr lang="en-GB" dirty="0"/>
+          </a:p>
+        </p:txBody>
+      </p:sp>
+      <p:sp>
+        <p:nvSpPr>
+          <p:cNvPr id="3" name="Content Placeholder 2"/>
+          <p:cNvSpPr>
+            <a:spLocks noGrp="1"/>
+          </p:cNvSpPr>
+          <p:nvPr>
+            <p:ph idx="1"/>
+          </p:nvPr>
+        </p:nvSpPr>
+        <p:spPr/>
+        <p:txBody>
+          <a:bodyPr/>
+          <a:lstStyle/>
+          <a:p>
+            <a:r>
+              <a:rPr lang="en-GB" dirty="0" smtClean="0"/>
+              <a:t>Mailing list: </a:t>
+            </a:r>
+            <a:r>
+              <a:rPr lang="en-GB" dirty="0" smtClean="0">
+                <a:hlinkClick r:id="rId2"/>
+              </a:rPr>
+              <a:t>https://mlist.is.ed.ac.uk/list/info/intrescomp</a:t>
+            </a:r>
+            <a:endParaRPr lang="en-GB" dirty="0" smtClean="0"/>
+          </a:p>
+          <a:p>
+            <a:r>
+              <a:rPr lang="en-GB" dirty="0" smtClean="0"/>
+              <a:t>Wiki: </a:t>
+            </a:r>
+            <a:r>
+              <a:rPr lang="en-GB" dirty="0" smtClean="0">
+                <a:hlinkClick r:id="rId3"/>
+              </a:rPr>
+              <a:t>https://www.wiki.ed.ac.uk/display/intrescomp</a:t>
+            </a:r>
+            <a:endParaRPr lang="en-GB" dirty="0" smtClean="0"/>
+          </a:p>
+          <a:p>
+            <a:r>
+              <a:rPr lang="en-GB" dirty="0" smtClean="0"/>
+              <a:t>Google calendar: </a:t>
+            </a:r>
+            <a:endParaRPr lang="en-GB" dirty="0" smtClean="0"/>
+          </a:p>
+          <a:p>
+            <a:pPr>
+              <a:buNone/>
+            </a:pPr>
+            <a:r>
+              <a:rPr lang="en-GB" dirty="0" smtClean="0"/>
+              <a:t>	</a:t>
+            </a:r>
+            <a:r>
+              <a:rPr lang="en-GB" dirty="0" smtClean="0">
+                <a:hlinkClick r:id="rId4"/>
+              </a:rPr>
+              <a:t>http</a:t>
+            </a:r>
+            <a:r>
+              <a:rPr lang="en-GB" dirty="0" smtClean="0">
+                <a:hlinkClick r:id="rId4"/>
+              </a:rPr>
+              <a:t>://goo.gl/wvrui</a:t>
+            </a:r>
+            <a:endParaRPr lang="en-GB" dirty="0" smtClean="0"/>
+          </a:p>
+          <a:p>
+            <a:endParaRPr lang="en-GB" dirty="0"/>
           </a:p>
         </p:txBody>
       </p:sp>
@@ -5209,141 +5336,107 @@
           <a:p>
             <a:r>
               <a:rPr lang="en-GB" dirty="0" smtClean="0"/>
-              <a:t>Saving customizations</a:t>
-            </a:r>
-            <a:endParaRPr lang="en-GB" dirty="0"/>
-          </a:p>
-        </p:txBody>
-      </p:sp>
-      <p:sp>
-        <p:nvSpPr>
-          <p:cNvPr id="3" name="Content Placeholder 2"/>
-          <p:cNvSpPr>
-            <a:spLocks noGrp="1"/>
-          </p:cNvSpPr>
-          <p:nvPr>
-            <p:ph idx="1"/>
-          </p:nvPr>
-        </p:nvSpPr>
-        <p:spPr/>
-        <p:txBody>
-          <a:bodyPr/>
-          <a:lstStyle/>
-          <a:p>
-            <a:pPr>
-              <a:buNone/>
-            </a:pPr>
-            <a:r>
-              <a:rPr lang="en-GB" dirty="0" smtClean="0">
-                <a:latin typeface="Courier New" pitchFamily="49" charset="0"/>
-                <a:cs typeface="Courier New" pitchFamily="49" charset="0"/>
-              </a:rPr>
-              <a:t>.profile </a:t>
-            </a:r>
-            <a:r>
-              <a:rPr lang="en-GB" dirty="0" smtClean="0">
-                <a:latin typeface="+mj-lt"/>
-                <a:cs typeface="Courier New" pitchFamily="49" charset="0"/>
-              </a:rPr>
-              <a:t>– read by non-</a:t>
-            </a:r>
-            <a:r>
-              <a:rPr lang="en-GB" dirty="0" err="1" smtClean="0">
-                <a:latin typeface="+mj-lt"/>
-                <a:cs typeface="Courier New" pitchFamily="49" charset="0"/>
-              </a:rPr>
-              <a:t>iteractive</a:t>
-            </a:r>
-            <a:r>
-              <a:rPr lang="en-GB" dirty="0" smtClean="0">
-                <a:latin typeface="+mj-lt"/>
-                <a:cs typeface="Courier New" pitchFamily="49" charset="0"/>
-              </a:rPr>
-              <a:t> shells (like your Window Manager)</a:t>
-            </a:r>
-          </a:p>
-          <a:p>
-            <a:pPr>
-              <a:buNone/>
-            </a:pPr>
-            <a:endParaRPr lang="en-GB" dirty="0" smtClean="0">
-              <a:latin typeface="+mj-lt"/>
+              <a:t>Special variable </a:t>
+            </a:r>
+            <a:r>
+              <a:rPr lang="en-GB" dirty="0" smtClean="0">
+                <a:latin typeface="Courier New" pitchFamily="49" charset="0"/>
+                <a:cs typeface="Courier New" pitchFamily="49" charset="0"/>
+              </a:rPr>
+              <a:t>$PS1</a:t>
+            </a:r>
+            <a:endParaRPr lang="en-GB" dirty="0">
+              <a:latin typeface="Courier New" pitchFamily="49" charset="0"/>
               <a:cs typeface="Courier New" pitchFamily="49" charset="0"/>
             </a:endParaRPr>
           </a:p>
-          <a:p>
-            <a:pPr>
-              <a:buNone/>
-            </a:pPr>
-            <a:r>
-              <a:rPr lang="en-GB" dirty="0" smtClean="0">
-                <a:latin typeface="Courier New" pitchFamily="49" charset="0"/>
-                <a:cs typeface="Courier New" pitchFamily="49" charset="0"/>
-              </a:rPr>
-              <a:t>.</a:t>
-            </a:r>
-            <a:r>
-              <a:rPr lang="en-GB" dirty="0" err="1" smtClean="0">
-                <a:latin typeface="Courier New" pitchFamily="49" charset="0"/>
-                <a:cs typeface="Courier New" pitchFamily="49" charset="0"/>
-              </a:rPr>
-              <a:t>bashrc</a:t>
-            </a:r>
-            <a:r>
-              <a:rPr lang="en-GB" dirty="0" smtClean="0">
-                <a:latin typeface="Courier New" pitchFamily="49" charset="0"/>
-                <a:cs typeface="Courier New" pitchFamily="49" charset="0"/>
-              </a:rPr>
-              <a:t> </a:t>
-            </a:r>
+        </p:txBody>
+      </p:sp>
+      <p:sp>
+        <p:nvSpPr>
+          <p:cNvPr id="3" name="Content Placeholder 2"/>
+          <p:cNvSpPr>
+            <a:spLocks noGrp="1"/>
+          </p:cNvSpPr>
+          <p:nvPr>
+            <p:ph idx="1"/>
+          </p:nvPr>
+        </p:nvSpPr>
+        <p:spPr/>
+        <p:txBody>
+          <a:bodyPr>
+            <a:normAutofit/>
+          </a:bodyPr>
+          <a:lstStyle/>
+          <a:p>
+            <a:pPr>
+              <a:buNone/>
+            </a:pPr>
             <a:r>
               <a:rPr lang="en-GB" dirty="0" smtClean="0">
                 <a:latin typeface="+mj-lt"/>
                 <a:cs typeface="Courier New" pitchFamily="49" charset="0"/>
               </a:rPr>
-              <a:t>– read by bash</a:t>
-            </a:r>
-          </a:p>
-          <a:p>
-            <a:pPr>
-              <a:buNone/>
-            </a:pPr>
-            <a:endParaRPr lang="en-GB" dirty="0" smtClean="0">
-              <a:latin typeface="+mj-lt"/>
-              <a:cs typeface="Courier New" pitchFamily="49" charset="0"/>
-            </a:endParaRPr>
-          </a:p>
-          <a:p>
-            <a:pPr>
-              <a:buNone/>
-            </a:pPr>
-            <a:r>
-              <a:rPr lang="en-GB" dirty="0" smtClean="0">
-                <a:latin typeface="Courier New" pitchFamily="49" charset="0"/>
-                <a:cs typeface="Courier New" pitchFamily="49" charset="0"/>
-              </a:rPr>
-              <a:t>.</a:t>
-            </a:r>
-            <a:r>
-              <a:rPr lang="en-GB" dirty="0" err="1" smtClean="0">
-                <a:latin typeface="Courier New" pitchFamily="49" charset="0"/>
-                <a:cs typeface="Courier New" pitchFamily="49" charset="0"/>
-              </a:rPr>
-              <a:t>bash_profile</a:t>
-            </a:r>
-            <a:r>
-              <a:rPr lang="en-GB" dirty="0" smtClean="0">
-                <a:latin typeface="Courier New" pitchFamily="49" charset="0"/>
-                <a:cs typeface="Courier New" pitchFamily="49" charset="0"/>
-              </a:rPr>
-              <a:t> </a:t>
-            </a:r>
+              <a:t>Bash prompt helps you quickly learn about your environment:</a:t>
+            </a:r>
+          </a:p>
+          <a:p>
+            <a:pPr lvl="1"/>
             <a:r>
               <a:rPr lang="en-GB" dirty="0" smtClean="0">
                 <a:latin typeface="+mj-lt"/>
                 <a:cs typeface="Courier New" pitchFamily="49" charset="0"/>
               </a:rPr>
-              <a:t>– read by both</a:t>
+              <a:t>Username</a:t>
+            </a:r>
+          </a:p>
+          <a:p>
+            <a:pPr lvl="1"/>
+            <a:r>
+              <a:rPr lang="en-GB" dirty="0" smtClean="0">
+                <a:latin typeface="+mj-lt"/>
+                <a:cs typeface="Courier New" pitchFamily="49" charset="0"/>
+              </a:rPr>
+              <a:t>Host</a:t>
+            </a:r>
+          </a:p>
+          <a:p>
+            <a:pPr lvl="1"/>
+            <a:r>
+              <a:rPr lang="en-GB" dirty="0" smtClean="0">
+                <a:latin typeface="+mj-lt"/>
+                <a:cs typeface="Courier New" pitchFamily="49" charset="0"/>
+              </a:rPr>
+              <a:t>Current working directory</a:t>
+            </a:r>
+          </a:p>
+          <a:p>
+            <a:pPr lvl="1"/>
+            <a:r>
+              <a:rPr lang="en-GB" dirty="0" smtClean="0">
+                <a:latin typeface="+mj-lt"/>
+                <a:cs typeface="Courier New" pitchFamily="49" charset="0"/>
+              </a:rPr>
+              <a:t>Time</a:t>
+            </a:r>
+          </a:p>
+          <a:p>
+            <a:pPr>
+              <a:buNone/>
+            </a:pPr>
+            <a:r>
+              <a:rPr lang="en-GB" dirty="0" smtClean="0">
+                <a:latin typeface="+mj-lt"/>
+                <a:cs typeface="Courier New" pitchFamily="49" charset="0"/>
+              </a:rPr>
+              <a:t>The variable defining prompt is called </a:t>
+            </a:r>
+            <a:r>
+              <a:rPr lang="en-GB" dirty="0" smtClean="0">
+                <a:latin typeface="Courier New" pitchFamily="49" charset="0"/>
+                <a:cs typeface="Courier New" pitchFamily="49" charset="0"/>
+              </a:rPr>
+              <a:t>$PS1</a:t>
             </a:r>
           </a:p>
         </p:txBody>
@@ -5390,107 +5483,141 @@
           <a:p>
             <a:r>
               <a:rPr lang="en-GB" dirty="0" smtClean="0"/>
-              <a:t>Special variable </a:t>
-            </a:r>
-            <a:r>
-              <a:rPr lang="en-GB" dirty="0" smtClean="0">
-                <a:latin typeface="Courier New" pitchFamily="49" charset="0"/>
-                <a:cs typeface="Courier New" pitchFamily="49" charset="0"/>
-              </a:rPr>
-              <a:t>$PS1</a:t>
-            </a:r>
-            <a:endParaRPr lang="en-GB" dirty="0">
-              <a:latin typeface="Courier New" pitchFamily="49" charset="0"/>
+              <a:t>Saving customizations</a:t>
+            </a:r>
+            <a:endParaRPr lang="en-GB" dirty="0"/>
+          </a:p>
+        </p:txBody>
+      </p:sp>
+      <p:sp>
+        <p:nvSpPr>
+          <p:cNvPr id="3" name="Content Placeholder 2"/>
+          <p:cNvSpPr>
+            <a:spLocks noGrp="1"/>
+          </p:cNvSpPr>
+          <p:nvPr>
+            <p:ph idx="1"/>
+          </p:nvPr>
+        </p:nvSpPr>
+        <p:spPr/>
+        <p:txBody>
+          <a:bodyPr/>
+          <a:lstStyle/>
+          <a:p>
+            <a:pPr>
+              <a:buNone/>
+            </a:pPr>
+            <a:r>
+              <a:rPr lang="en-GB" dirty="0" smtClean="0">
+                <a:latin typeface="Courier New" pitchFamily="49" charset="0"/>
+                <a:cs typeface="Courier New" pitchFamily="49" charset="0"/>
+              </a:rPr>
+              <a:t>.profile </a:t>
+            </a:r>
+            <a:r>
+              <a:rPr lang="en-GB" dirty="0" smtClean="0">
+                <a:latin typeface="+mj-lt"/>
+                <a:cs typeface="Courier New" pitchFamily="49" charset="0"/>
+              </a:rPr>
+              <a:t>– read by non-</a:t>
+            </a:r>
+            <a:r>
+              <a:rPr lang="en-GB" dirty="0" err="1" smtClean="0">
+                <a:latin typeface="+mj-lt"/>
+                <a:cs typeface="Courier New" pitchFamily="49" charset="0"/>
+              </a:rPr>
+              <a:t>iteractive</a:t>
+            </a:r>
+            <a:r>
+              <a:rPr lang="en-GB" dirty="0" smtClean="0">
+                <a:latin typeface="+mj-lt"/>
+                <a:cs typeface="Courier New" pitchFamily="49" charset="0"/>
+              </a:rPr>
+              <a:t> shells (like your Window Manager)</a:t>
+            </a:r>
+          </a:p>
+          <a:p>
+            <a:pPr>
+              <a:buNone/>
+            </a:pPr>
+            <a:endParaRPr lang="en-GB" dirty="0" smtClean="0">
+              <a:latin typeface="+mj-lt"/>
               <a:cs typeface="Courier New" pitchFamily="49" charset="0"/>
             </a:endParaRPr>
           </a:p>
-        </p:txBody>
-      </p:sp>
-      <p:sp>
-        <p:nvSpPr>
-          <p:cNvPr id="3" name="Content Placeholder 2"/>
-          <p:cNvSpPr>
-            <a:spLocks noGrp="1"/>
-          </p:cNvSpPr>
-          <p:nvPr>
-            <p:ph idx="1"/>
-          </p:nvPr>
-        </p:nvSpPr>
-        <p:spPr/>
-        <p:txBody>
-          <a:bodyPr>
-            <a:normAutofit/>
-          </a:bodyPr>
-          <a:lstStyle/>
-          <a:p>
-            <a:pPr>
-              <a:buNone/>
-            </a:pPr>
+          <a:p>
+            <a:pPr>
+              <a:buNone/>
+            </a:pPr>
+            <a:r>
+              <a:rPr lang="en-GB" dirty="0" smtClean="0">
+                <a:latin typeface="Courier New" pitchFamily="49" charset="0"/>
+                <a:cs typeface="Courier New" pitchFamily="49" charset="0"/>
+              </a:rPr>
+              <a:t>.</a:t>
+            </a:r>
+            <a:r>
+              <a:rPr lang="en-GB" dirty="0" err="1" smtClean="0">
+                <a:latin typeface="Courier New" pitchFamily="49" charset="0"/>
+                <a:cs typeface="Courier New" pitchFamily="49" charset="0"/>
+              </a:rPr>
+              <a:t>bashrc</a:t>
+            </a:r>
+            <a:r>
+              <a:rPr lang="en-GB" dirty="0" smtClean="0">
+                <a:latin typeface="Courier New" pitchFamily="49" charset="0"/>
+                <a:cs typeface="Courier New" pitchFamily="49" charset="0"/>
+              </a:rPr>
+              <a:t> </a:t>
+            </a:r>
             <a:r>
               <a:rPr lang="en-GB" dirty="0" smtClean="0">
                 <a:latin typeface="+mj-lt"/>
                 <a:cs typeface="Courier New" pitchFamily="49" charset="0"/>
               </a:rPr>
-              <a:t>Bash prompt helps you quickly learn about your environment:</a:t>
-            </a:r>
-          </a:p>
-          <a:p>
-            <a:pPr lvl="1"/>
+              <a:t>– read by bash</a:t>
+            </a:r>
+          </a:p>
+          <a:p>
+            <a:pPr>
+              <a:buNone/>
+            </a:pPr>
+            <a:endParaRPr lang="en-GB" dirty="0" smtClean="0">
+              <a:latin typeface="+mj-lt"/>
+              <a:cs typeface="Courier New" pitchFamily="49" charset="0"/>
+            </a:endParaRPr>
+          </a:p>
+          <a:p>
+            <a:pPr>
+              <a:buNone/>
+            </a:pPr>
+            <a:r>
+              <a:rPr lang="en-GB" dirty="0" smtClean="0">
+                <a:latin typeface="Courier New" pitchFamily="49" charset="0"/>
+                <a:cs typeface="Courier New" pitchFamily="49" charset="0"/>
+              </a:rPr>
+              <a:t>.</a:t>
+            </a:r>
+            <a:r>
+              <a:rPr lang="en-GB" dirty="0" err="1" smtClean="0">
+                <a:latin typeface="Courier New" pitchFamily="49" charset="0"/>
+                <a:cs typeface="Courier New" pitchFamily="49" charset="0"/>
+              </a:rPr>
+              <a:t>bash_profile</a:t>
+            </a:r>
+            <a:r>
+              <a:rPr lang="en-GB" dirty="0" smtClean="0">
+                <a:latin typeface="Courier New" pitchFamily="49" charset="0"/>
+                <a:cs typeface="Courier New" pitchFamily="49" charset="0"/>
+              </a:rPr>
+              <a:t> </a:t>
+            </a:r>
             <a:r>
               <a:rPr lang="en-GB" dirty="0" smtClean="0">
                 <a:latin typeface="+mj-lt"/>
                 <a:cs typeface="Courier New" pitchFamily="49" charset="0"/>
               </a:rPr>
-              <a:t>Username</a:t>
-            </a:r>
-          </a:p>
-          <a:p>
-            <a:pPr lvl="1"/>
-            <a:r>
-              <a:rPr lang="en-GB" dirty="0" smtClean="0">
-                <a:latin typeface="+mj-lt"/>
-                <a:cs typeface="Courier New" pitchFamily="49" charset="0"/>
-              </a:rPr>
-              <a:t>Host</a:t>
-            </a:r>
-          </a:p>
-          <a:p>
-            <a:pPr lvl="1"/>
-            <a:r>
-              <a:rPr lang="en-GB" dirty="0" smtClean="0">
-                <a:latin typeface="+mj-lt"/>
-                <a:cs typeface="Courier New" pitchFamily="49" charset="0"/>
-              </a:rPr>
-              <a:t>Current working directory</a:t>
-            </a:r>
-          </a:p>
-          <a:p>
-            <a:pPr lvl="1"/>
-            <a:r>
-              <a:rPr lang="en-GB" dirty="0" smtClean="0">
-                <a:latin typeface="+mj-lt"/>
-                <a:cs typeface="Courier New" pitchFamily="49" charset="0"/>
-              </a:rPr>
-              <a:t>Time</a:t>
-            </a:r>
-          </a:p>
-          <a:p>
-            <a:pPr>
-              <a:buNone/>
-            </a:pPr>
-            <a:r>
-              <a:rPr lang="en-GB" dirty="0" smtClean="0">
-                <a:latin typeface="+mj-lt"/>
-                <a:cs typeface="Courier New" pitchFamily="49" charset="0"/>
-              </a:rPr>
-              <a:t>The variable defining prompt is called </a:t>
-            </a:r>
-            <a:r>
-              <a:rPr lang="en-GB" dirty="0" smtClean="0">
-                <a:latin typeface="Courier New" pitchFamily="49" charset="0"/>
-                <a:cs typeface="Courier New" pitchFamily="49" charset="0"/>
-              </a:rPr>
-              <a:t>$PS1</a:t>
+              <a:t>– read by both</a:t>
             </a:r>
           </a:p>
         </p:txBody>
@@ -5720,14 +5847,7 @@
                 <a:latin typeface="Courier New" pitchFamily="49" charset="0"/>
                 <a:cs typeface="Courier New" pitchFamily="49" charset="0"/>
               </a:rPr>
-              <a:t>.</a:t>
-            </a:r>
-            <a:r>
-              <a:rPr lang="en-GB" smtClean="0">
-                <a:latin typeface="Courier New" pitchFamily="49" charset="0"/>
-                <a:cs typeface="Courier New" pitchFamily="49" charset="0"/>
-              </a:rPr>
-              <a:t>profile </a:t>
+              <a:t>.profile </a:t>
             </a:r>
             <a:r>
               <a:rPr lang="en-GB" dirty="0" smtClean="0">

</xml_diff>